<commit_message>
ajouts des boucles et fin de cours 2
</commit_message>
<xml_diff>
--- a/Les_transparent/liste.pptx
+++ b/Les_transparent/liste.pptx
@@ -244,7 +244,7 @@
           <a:p>
             <a:fld id="{DE079E28-5EF0-47BA-B06A-41CB89A3291E}" type="datetimeFigureOut">
               <a:rPr lang="en-US" smtClean="0"/>
-              <a:t>9/22/2015</a:t>
+              <a:t>9/29/2015</a:t>
             </a:fld>
             <a:endParaRPr lang="en-US"/>
           </a:p>
@@ -414,7 +414,7 @@
           <a:p>
             <a:fld id="{DE079E28-5EF0-47BA-B06A-41CB89A3291E}" type="datetimeFigureOut">
               <a:rPr lang="en-US" smtClean="0"/>
-              <a:t>9/22/2015</a:t>
+              <a:t>9/29/2015</a:t>
             </a:fld>
             <a:endParaRPr lang="en-US"/>
           </a:p>
@@ -594,7 +594,7 @@
           <a:p>
             <a:fld id="{DE079E28-5EF0-47BA-B06A-41CB89A3291E}" type="datetimeFigureOut">
               <a:rPr lang="en-US" smtClean="0"/>
-              <a:t>9/22/2015</a:t>
+              <a:t>9/29/2015</a:t>
             </a:fld>
             <a:endParaRPr lang="en-US"/>
           </a:p>
@@ -764,7 +764,7 @@
           <a:p>
             <a:fld id="{DE079E28-5EF0-47BA-B06A-41CB89A3291E}" type="datetimeFigureOut">
               <a:rPr lang="en-US" smtClean="0"/>
-              <a:t>9/22/2015</a:t>
+              <a:t>9/29/2015</a:t>
             </a:fld>
             <a:endParaRPr lang="en-US"/>
           </a:p>
@@ -1010,7 +1010,7 @@
           <a:p>
             <a:fld id="{DE079E28-5EF0-47BA-B06A-41CB89A3291E}" type="datetimeFigureOut">
               <a:rPr lang="en-US" smtClean="0"/>
-              <a:t>9/22/2015</a:t>
+              <a:t>9/29/2015</a:t>
             </a:fld>
             <a:endParaRPr lang="en-US"/>
           </a:p>
@@ -1242,7 +1242,7 @@
           <a:p>
             <a:fld id="{DE079E28-5EF0-47BA-B06A-41CB89A3291E}" type="datetimeFigureOut">
               <a:rPr lang="en-US" smtClean="0"/>
-              <a:t>9/22/2015</a:t>
+              <a:t>9/29/2015</a:t>
             </a:fld>
             <a:endParaRPr lang="en-US"/>
           </a:p>
@@ -1609,7 +1609,7 @@
           <a:p>
             <a:fld id="{DE079E28-5EF0-47BA-B06A-41CB89A3291E}" type="datetimeFigureOut">
               <a:rPr lang="en-US" smtClean="0"/>
-              <a:t>9/22/2015</a:t>
+              <a:t>9/29/2015</a:t>
             </a:fld>
             <a:endParaRPr lang="en-US"/>
           </a:p>
@@ -1727,7 +1727,7 @@
           <a:p>
             <a:fld id="{DE079E28-5EF0-47BA-B06A-41CB89A3291E}" type="datetimeFigureOut">
               <a:rPr lang="en-US" smtClean="0"/>
-              <a:t>9/22/2015</a:t>
+              <a:t>9/29/2015</a:t>
             </a:fld>
             <a:endParaRPr lang="en-US"/>
           </a:p>
@@ -1822,7 +1822,7 @@
           <a:p>
             <a:fld id="{DE079E28-5EF0-47BA-B06A-41CB89A3291E}" type="datetimeFigureOut">
               <a:rPr lang="en-US" smtClean="0"/>
-              <a:t>9/22/2015</a:t>
+              <a:t>9/29/2015</a:t>
             </a:fld>
             <a:endParaRPr lang="en-US"/>
           </a:p>
@@ -2099,7 +2099,7 @@
           <a:p>
             <a:fld id="{DE079E28-5EF0-47BA-B06A-41CB89A3291E}" type="datetimeFigureOut">
               <a:rPr lang="en-US" smtClean="0"/>
-              <a:t>9/22/2015</a:t>
+              <a:t>9/29/2015</a:t>
             </a:fld>
             <a:endParaRPr lang="en-US"/>
           </a:p>
@@ -2352,7 +2352,7 @@
           <a:p>
             <a:fld id="{DE079E28-5EF0-47BA-B06A-41CB89A3291E}" type="datetimeFigureOut">
               <a:rPr lang="en-US" smtClean="0"/>
-              <a:t>9/22/2015</a:t>
+              <a:t>9/29/2015</a:t>
             </a:fld>
             <a:endParaRPr lang="en-US"/>
           </a:p>
@@ -2565,7 +2565,7 @@
           <a:p>
             <a:fld id="{DE079E28-5EF0-47BA-B06A-41CB89A3291E}" type="datetimeFigureOut">
               <a:rPr lang="en-US" smtClean="0"/>
-              <a:t>9/22/2015</a:t>
+              <a:t>9/29/2015</a:t>
             </a:fld>
             <a:endParaRPr lang="en-US"/>
           </a:p>
@@ -9681,21 +9681,8 @@
                   <a:srgbClr val="FFFF00"/>
                 </a:solidFill>
               </a:rPr>
-              <a:t>’, 2</a:t>
+              <a:t>’, 2 </a:t>
             </a:r>
-            <a:r>
-              <a:rPr lang="en-US" sz="1100" dirty="0" smtClean="0">
-                <a:solidFill>
-                  <a:srgbClr val="FFFF00"/>
-                </a:solidFill>
-              </a:rPr>
-              <a:t> </a:t>
-            </a:r>
-            <a:endParaRPr lang="en-US" sz="1100" dirty="0" smtClean="0">
-              <a:solidFill>
-                <a:srgbClr val="FFFF00"/>
-              </a:solidFill>
-            </a:endParaRPr>
           </a:p>
           <a:p>
             <a:r>
@@ -10002,11 +9989,6 @@
                 </a:rPr>
                 <a:t>x</a:t>
               </a:r>
-              <a:endParaRPr lang="en-US" sz="1100" dirty="0">
-                <a:solidFill>
-                  <a:srgbClr val="C00000"/>
-                </a:solidFill>
-              </a:endParaRPr>
             </a:p>
           </p:txBody>
         </p:sp>
@@ -10367,13 +10349,6 @@
                 </a:rPr>
                 <a:t>X</a:t>
               </a:r>
-              <a:endParaRPr lang="en-US" sz="1100" dirty="0">
-                <a:solidFill>
-                  <a:schemeClr val="accent1">
-                    <a:lumMod val="50000"/>
-                  </a:schemeClr>
-                </a:solidFill>
-              </a:endParaRPr>
             </a:p>
           </p:txBody>
         </p:sp>
@@ -10631,13 +10606,6 @@
                 </a:rPr>
                 <a:t>X</a:t>
               </a:r>
-              <a:endParaRPr lang="en-US" sz="1100" dirty="0">
-                <a:solidFill>
-                  <a:schemeClr val="accent1">
-                    <a:lumMod val="50000"/>
-                  </a:schemeClr>
-                </a:solidFill>
-              </a:endParaRPr>
             </a:p>
           </p:txBody>
         </p:sp>
@@ -11168,21 +11136,8 @@
                   <a:srgbClr val="FFFF00"/>
                 </a:solidFill>
               </a:rPr>
-              <a:t>’, 2</a:t>
+              <a:t>’, 2 </a:t>
             </a:r>
-            <a:r>
-              <a:rPr lang="en-US" sz="1100" dirty="0" smtClean="0">
-                <a:solidFill>
-                  <a:srgbClr val="FFFF00"/>
-                </a:solidFill>
-              </a:rPr>
-              <a:t> </a:t>
-            </a:r>
-            <a:endParaRPr lang="en-US" sz="1100" dirty="0" smtClean="0">
-              <a:solidFill>
-                <a:srgbClr val="FFFF00"/>
-              </a:solidFill>
-            </a:endParaRPr>
           </a:p>
           <a:p>
             <a:r>
@@ -11416,11 +11371,6 @@
                 </a:rPr>
                 <a:t>x</a:t>
               </a:r>
-              <a:endParaRPr lang="en-US" sz="1100" dirty="0">
-                <a:solidFill>
-                  <a:srgbClr val="C00000"/>
-                </a:solidFill>
-              </a:endParaRPr>
             </a:p>
           </p:txBody>
         </p:sp>
@@ -11823,6 +11773,480 @@
             </a:p>
           </p:txBody>
         </p:sp>
+      </p:grpSp>
+      <p:grpSp>
+        <p:nvGrpSpPr>
+          <p:cNvPr id="48" name="Groupe 47"/>
+          <p:cNvGrpSpPr/>
+          <p:nvPr/>
+        </p:nvGrpSpPr>
+        <p:grpSpPr>
+          <a:xfrm>
+            <a:off x="1829185" y="4683725"/>
+            <a:ext cx="7315200" cy="2008514"/>
+            <a:chOff x="2015367" y="1115704"/>
+            <a:chExt cx="7315200" cy="2008514"/>
+          </a:xfrm>
+        </p:grpSpPr>
+        <p:sp>
+          <p:nvSpPr>
+            <p:cNvPr id="50" name="ZoneTexte 49"/>
+            <p:cNvSpPr txBox="1"/>
+            <p:nvPr/>
+          </p:nvSpPr>
+          <p:spPr>
+            <a:xfrm>
+              <a:off x="2015367" y="1115704"/>
+              <a:ext cx="7315200" cy="1754326"/>
+            </a:xfrm>
+            <a:prstGeom prst="rect">
+              <a:avLst/>
+            </a:prstGeom>
+            <a:noFill/>
+          </p:spPr>
+          <p:txBody>
+            <a:bodyPr wrap="square" rtlCol="0">
+              <a:spAutoFit/>
+            </a:bodyPr>
+            <a:lstStyle/>
+            <a:p>
+              <a:r>
+                <a:rPr lang="en-US" dirty="0" err="1" smtClean="0"/>
+                <a:t>Lst</a:t>
+              </a:r>
+              <a:r>
+                <a:rPr lang="en-US" dirty="0" smtClean="0"/>
+                <a:t> = [ 6 , 5+3j,  ‘Python’,  [5, 2],  1]</a:t>
+              </a:r>
+            </a:p>
+            <a:p>
+              <a:endParaRPr lang="en-US" dirty="0"/>
+            </a:p>
+            <a:p>
+              <a:endParaRPr lang="en-US" dirty="0" smtClean="0"/>
+            </a:p>
+            <a:p>
+              <a:endParaRPr lang="en-US" dirty="0"/>
+            </a:p>
+            <a:p>
+              <a:endParaRPr lang="en-US" dirty="0" smtClean="0"/>
+            </a:p>
+            <a:p>
+              <a:endParaRPr lang="en-US" dirty="0"/>
+            </a:p>
+          </p:txBody>
+        </p:sp>
+        <p:grpSp>
+          <p:nvGrpSpPr>
+            <p:cNvPr id="59" name="Groupe 58"/>
+            <p:cNvGrpSpPr/>
+            <p:nvPr/>
+          </p:nvGrpSpPr>
+          <p:grpSpPr>
+            <a:xfrm>
+              <a:off x="2016982" y="1625218"/>
+              <a:ext cx="5816378" cy="1499000"/>
+              <a:chOff x="1696278" y="4256473"/>
+              <a:chExt cx="5665968" cy="1361271"/>
+            </a:xfrm>
+          </p:grpSpPr>
+          <p:sp>
+            <p:nvSpPr>
+              <p:cNvPr id="70" name="ZoneTexte 69"/>
+              <p:cNvSpPr txBox="1"/>
+              <p:nvPr/>
+            </p:nvSpPr>
+            <p:spPr>
+              <a:xfrm>
+                <a:off x="2094664" y="5156079"/>
+                <a:ext cx="4900495" cy="461665"/>
+              </a:xfrm>
+              <a:prstGeom prst="rect">
+                <a:avLst/>
+              </a:prstGeom>
+              <a:noFill/>
+              <a:ln w="19050">
+                <a:solidFill>
+                  <a:schemeClr val="bg1"/>
+                </a:solidFill>
+              </a:ln>
+            </p:spPr>
+            <p:txBody>
+              <a:bodyPr wrap="square" rtlCol="0">
+                <a:spAutoFit/>
+              </a:bodyPr>
+              <a:lstStyle/>
+              <a:p>
+                <a:r>
+                  <a:rPr lang="en-US" sz="1100" dirty="0" smtClean="0"/>
+                  <a:t> </a:t>
+                </a:r>
+                <a:r>
+                  <a:rPr lang="en-US" sz="1200" dirty="0" smtClean="0">
+                    <a:solidFill>
+                      <a:srgbClr val="FF0000"/>
+                    </a:solidFill>
+                  </a:rPr>
+                  <a:t>0 	1	2	      3	          4</a:t>
+                </a:r>
+              </a:p>
+              <a:p>
+                <a:r>
+                  <a:rPr lang="en-US" sz="1200" dirty="0" smtClean="0">
+                    <a:solidFill>
+                      <a:srgbClr val="FF0000"/>
+                    </a:solidFill>
+                  </a:rPr>
+                  <a:t>-5                    - 4                       -3                             -2                           -1</a:t>
+                </a:r>
+              </a:p>
+            </p:txBody>
+          </p:sp>
+          <p:sp>
+            <p:nvSpPr>
+              <p:cNvPr id="71" name="ZoneTexte 70"/>
+              <p:cNvSpPr txBox="1"/>
+              <p:nvPr/>
+            </p:nvSpPr>
+            <p:spPr>
+              <a:xfrm flipV="1">
+                <a:off x="1696278" y="4260294"/>
+                <a:ext cx="5665968" cy="867348"/>
+              </a:xfrm>
+              <a:prstGeom prst="rect">
+                <a:avLst/>
+              </a:prstGeom>
+              <a:ln/>
+            </p:spPr>
+            <p:style>
+              <a:lnRef idx="2">
+                <a:schemeClr val="accent6"/>
+              </a:lnRef>
+              <a:fillRef idx="1">
+                <a:schemeClr val="lt1"/>
+              </a:fillRef>
+              <a:effectRef idx="0">
+                <a:schemeClr val="accent6"/>
+              </a:effectRef>
+              <a:fontRef idx="minor">
+                <a:schemeClr val="dk1"/>
+              </a:fontRef>
+            </p:style>
+            <p:txBody>
+              <a:bodyPr wrap="square" lIns="72000" tIns="0" rIns="36000" bIns="36000" rtlCol="0">
+                <a:spAutoFit/>
+              </a:bodyPr>
+              <a:lstStyle/>
+              <a:p>
+                <a:endParaRPr lang="en-US" dirty="0" smtClean="0"/>
+              </a:p>
+              <a:p>
+                <a:endParaRPr lang="en-US" dirty="0"/>
+              </a:p>
+              <a:p>
+                <a:endParaRPr lang="en-US" dirty="0"/>
+              </a:p>
+            </p:txBody>
+          </p:sp>
+          <p:sp>
+            <p:nvSpPr>
+              <p:cNvPr id="76" name="ZoneTexte 75"/>
+              <p:cNvSpPr txBox="1"/>
+              <p:nvPr/>
+            </p:nvSpPr>
+            <p:spPr>
+              <a:xfrm flipV="1">
+                <a:off x="2016982" y="4463821"/>
+                <a:ext cx="357147" cy="453183"/>
+              </a:xfrm>
+              <a:prstGeom prst="rect">
+                <a:avLst/>
+              </a:prstGeom>
+              <a:noFill/>
+              <a:ln w="19050">
+                <a:solidFill>
+                  <a:schemeClr val="tx1"/>
+                </a:solidFill>
+              </a:ln>
+            </p:spPr>
+            <p:txBody>
+              <a:bodyPr wrap="square" lIns="72000" tIns="72000" rIns="72000" bIns="72000" rtlCol="0">
+                <a:spAutoFit/>
+              </a:bodyPr>
+              <a:lstStyle/>
+              <a:p>
+                <a:pPr algn="ctr"/>
+                <a:r>
+                  <a:rPr lang="en-US" sz="2000" dirty="0" smtClean="0"/>
+                  <a:t>9</a:t>
+                </a:r>
+              </a:p>
+            </p:txBody>
+          </p:sp>
+          <p:sp>
+            <p:nvSpPr>
+              <p:cNvPr id="77" name="ZoneTexte 76"/>
+              <p:cNvSpPr txBox="1"/>
+              <p:nvPr/>
+            </p:nvSpPr>
+            <p:spPr>
+              <a:xfrm rot="10800000" flipV="1">
+                <a:off x="2463245" y="4448092"/>
+                <a:ext cx="950515" cy="453183"/>
+              </a:xfrm>
+              <a:prstGeom prst="rect">
+                <a:avLst/>
+              </a:prstGeom>
+              <a:noFill/>
+              <a:ln w="19050">
+                <a:solidFill>
+                  <a:schemeClr val="tx1"/>
+                </a:solidFill>
+              </a:ln>
+            </p:spPr>
+            <p:txBody>
+              <a:bodyPr wrap="square" lIns="72000" tIns="72000" rIns="72000" bIns="72000" rtlCol="0">
+                <a:spAutoFit/>
+              </a:bodyPr>
+              <a:lstStyle/>
+              <a:p>
+                <a:pPr algn="ctr"/>
+                <a:r>
+                  <a:rPr lang="en-US" sz="2000" dirty="0" smtClean="0"/>
+                  <a:t>5+3j</a:t>
+                </a:r>
+              </a:p>
+            </p:txBody>
+          </p:sp>
+          <p:sp>
+            <p:nvSpPr>
+              <p:cNvPr id="78" name="ZoneTexte 77"/>
+              <p:cNvSpPr txBox="1"/>
+              <p:nvPr/>
+            </p:nvSpPr>
+            <p:spPr>
+              <a:xfrm rot="10800000" flipV="1">
+                <a:off x="3484324" y="4448092"/>
+                <a:ext cx="1102916" cy="453183"/>
+              </a:xfrm>
+              <a:prstGeom prst="rect">
+                <a:avLst/>
+              </a:prstGeom>
+              <a:noFill/>
+              <a:ln w="19050">
+                <a:solidFill>
+                  <a:schemeClr val="tx1"/>
+                </a:solidFill>
+              </a:ln>
+            </p:spPr>
+            <p:txBody>
+              <a:bodyPr wrap="square" lIns="72000" tIns="72000" rIns="72000" bIns="72000" rtlCol="0">
+                <a:spAutoFit/>
+              </a:bodyPr>
+              <a:lstStyle/>
+              <a:p>
+                <a:pPr algn="ctr"/>
+                <a:r>
+                  <a:rPr lang="en-US" sz="2000" dirty="0" smtClean="0"/>
+                  <a:t>‘Python’</a:t>
+                </a:r>
+              </a:p>
+            </p:txBody>
+          </p:sp>
+          <p:grpSp>
+            <p:nvGrpSpPr>
+              <p:cNvPr id="79" name="Groupe 78"/>
+              <p:cNvGrpSpPr/>
+              <p:nvPr/>
+            </p:nvGrpSpPr>
+            <p:grpSpPr>
+              <a:xfrm>
+                <a:off x="4676356" y="4452406"/>
+                <a:ext cx="1191043" cy="444557"/>
+                <a:chOff x="5484076" y="4513366"/>
+                <a:chExt cx="1191043" cy="444557"/>
+              </a:xfrm>
+            </p:grpSpPr>
+            <p:sp>
+              <p:nvSpPr>
+                <p:cNvPr id="82" name="ZoneTexte 81"/>
+                <p:cNvSpPr txBox="1"/>
+                <p:nvPr/>
+              </p:nvSpPr>
+              <p:spPr>
+                <a:xfrm rot="10800000" flipV="1">
+                  <a:off x="5484076" y="4513366"/>
+                  <a:ext cx="1191043" cy="444557"/>
+                </a:xfrm>
+                <a:prstGeom prst="rect">
+                  <a:avLst/>
+                </a:prstGeom>
+                <a:noFill/>
+                <a:ln w="19050">
+                  <a:solidFill>
+                    <a:schemeClr val="tx1"/>
+                  </a:solidFill>
+                </a:ln>
+              </p:spPr>
+              <p:txBody>
+                <a:bodyPr wrap="square" lIns="72000" tIns="108000" rIns="72000" bIns="72000" rtlCol="0">
+                  <a:spAutoFit/>
+                </a:bodyPr>
+                <a:lstStyle/>
+                <a:p>
+                  <a:pPr algn="ctr"/>
+                  <a:endParaRPr lang="en-US" sz="2000" dirty="0" smtClean="0"/>
+                </a:p>
+              </p:txBody>
+            </p:sp>
+            <p:sp>
+              <p:nvSpPr>
+                <p:cNvPr id="83" name="ZoneTexte 82"/>
+                <p:cNvSpPr txBox="1"/>
+                <p:nvPr/>
+              </p:nvSpPr>
+              <p:spPr>
+                <a:xfrm rot="10800000" flipV="1">
+                  <a:off x="5584792" y="4565775"/>
+                  <a:ext cx="383323" cy="345523"/>
+                </a:xfrm>
+                <a:prstGeom prst="rect">
+                  <a:avLst/>
+                </a:prstGeom>
+                <a:noFill/>
+                <a:ln w="19050">
+                  <a:solidFill>
+                    <a:schemeClr val="tx1"/>
+                  </a:solidFill>
+                </a:ln>
+              </p:spPr>
+              <p:txBody>
+                <a:bodyPr wrap="square" lIns="72000" tIns="36000" rIns="36000" bIns="36000" rtlCol="0">
+                  <a:spAutoFit/>
+                </a:bodyPr>
+                <a:lstStyle/>
+                <a:p>
+                  <a:pPr algn="ctr"/>
+                  <a:r>
+                    <a:rPr lang="en-US" sz="2000" dirty="0" smtClean="0"/>
+                    <a:t>5</a:t>
+                  </a:r>
+                </a:p>
+              </p:txBody>
+            </p:sp>
+            <p:sp>
+              <p:nvSpPr>
+                <p:cNvPr id="84" name="ZoneTexte 83"/>
+                <p:cNvSpPr txBox="1"/>
+                <p:nvPr/>
+              </p:nvSpPr>
+              <p:spPr>
+                <a:xfrm rot="10800000" flipV="1">
+                  <a:off x="6147845" y="4565775"/>
+                  <a:ext cx="383323" cy="345523"/>
+                </a:xfrm>
+                <a:prstGeom prst="rect">
+                  <a:avLst/>
+                </a:prstGeom>
+                <a:noFill/>
+                <a:ln w="19050">
+                  <a:solidFill>
+                    <a:schemeClr val="tx1"/>
+                  </a:solidFill>
+                </a:ln>
+              </p:spPr>
+              <p:txBody>
+                <a:bodyPr wrap="square" lIns="72000" tIns="36000" rIns="72000" bIns="36000" rtlCol="0">
+                  <a:spAutoFit/>
+                </a:bodyPr>
+                <a:lstStyle/>
+                <a:p>
+                  <a:pPr algn="ctr"/>
+                  <a:r>
+                    <a:rPr lang="en-US" sz="2000" dirty="0"/>
+                    <a:t>2</a:t>
+                  </a:r>
+                  <a:endParaRPr lang="en-US" sz="2000" dirty="0" smtClean="0"/>
+                </a:p>
+              </p:txBody>
+            </p:sp>
+          </p:grpSp>
+          <p:sp>
+            <p:nvSpPr>
+              <p:cNvPr id="80" name="ZoneTexte 79"/>
+              <p:cNvSpPr txBox="1"/>
+              <p:nvPr/>
+            </p:nvSpPr>
+            <p:spPr>
+              <a:xfrm rot="10800000" flipV="1">
+                <a:off x="5934151" y="4448092"/>
+                <a:ext cx="950515" cy="453183"/>
+              </a:xfrm>
+              <a:prstGeom prst="rect">
+                <a:avLst/>
+              </a:prstGeom>
+              <a:noFill/>
+              <a:ln w="19050">
+                <a:solidFill>
+                  <a:schemeClr val="tx1"/>
+                </a:solidFill>
+              </a:ln>
+            </p:spPr>
+            <p:txBody>
+              <a:bodyPr wrap="square" lIns="72000" tIns="72000" rIns="72000" bIns="72000" rtlCol="0">
+                <a:spAutoFit/>
+              </a:bodyPr>
+              <a:lstStyle/>
+              <a:p>
+                <a:pPr algn="ctr"/>
+                <a:r>
+                  <a:rPr lang="en-US" sz="2000" dirty="0" smtClean="0"/>
+                  <a:t>1</a:t>
+                </a:r>
+              </a:p>
+            </p:txBody>
+          </p:sp>
+          <p:sp>
+            <p:nvSpPr>
+              <p:cNvPr id="81" name="ZoneTexte 80"/>
+              <p:cNvSpPr txBox="1"/>
+              <p:nvPr/>
+            </p:nvSpPr>
+            <p:spPr>
+              <a:xfrm>
+                <a:off x="4752743" y="4256473"/>
+                <a:ext cx="1216142" cy="276999"/>
+              </a:xfrm>
+              <a:prstGeom prst="rect">
+                <a:avLst/>
+              </a:prstGeom>
+              <a:noFill/>
+              <a:ln w="19050">
+                <a:noFill/>
+              </a:ln>
+            </p:spPr>
+            <p:txBody>
+              <a:bodyPr wrap="square" rtlCol="0">
+                <a:spAutoFit/>
+              </a:bodyPr>
+              <a:lstStyle/>
+              <a:p>
+                <a:r>
+                  <a:rPr lang="en-US" sz="1100" dirty="0" smtClean="0"/>
+                  <a:t> </a:t>
+                </a:r>
+                <a:r>
+                  <a:rPr lang="en-US" sz="1200" dirty="0" smtClean="0">
+                    <a:solidFill>
+                      <a:srgbClr val="FF0000"/>
+                    </a:solidFill>
+                  </a:rPr>
+                  <a:t>0                1  </a:t>
+                </a:r>
+              </a:p>
+            </p:txBody>
+          </p:sp>
+        </p:grpSp>
       </p:grpSp>
     </p:spTree>
     <p:extLst>

</xml_diff>